<commit_message>
typescript: add text and update some materials
</commit_message>
<xml_diff>
--- a/typescript/typescript.pptx
+++ b/typescript/typescript.pptx
@@ -5,9 +5,10 @@
     <p:sldMasterId id="2147483696" r:id="rId1"/>
   </p:sldMasterIdLst>
   <p:sldIdLst>
-    <p:sldId id="258" r:id="rId2"/>
+    <p:sldId id="257" r:id="rId2"/>
     <p:sldId id="256" r:id="rId3"/>
-    <p:sldId id="257" r:id="rId4"/>
+    <p:sldId id="258" r:id="rId4"/>
+    <p:sldId id="259" r:id="rId5"/>
   </p:sldIdLst>
   <p:sldSz cx="12192000" cy="6858000"/>
   <p:notesSz cx="6858000" cy="9144000"/>
@@ -106,6 +107,11 @@
       </a:defRPr>
     </a:lvl9pPr>
   </p:defaultTextStyle>
+  <p:extLst>
+    <p:ext uri="{EFAFB233-063F-42B5-8137-9DF3F51BA10A}">
+      <p15:sldGuideLst xmlns:p15="http://schemas.microsoft.com/office/powerpoint/2012/main"/>
+    </p:ext>
+  </p:extLst>
 </p:presentation>
 </file>
 
@@ -295,7 +301,7 @@
           <a:p>
             <a:fld id="{982D7743-9A1D-43D5-BBB3-9B0F523A7A95}" type="datetimeFigureOut">
               <a:rPr lang="en-US" smtClean="0"/>
-              <a:t>10/10/2019</a:t>
+              <a:t>12/19/2019</a:t>
             </a:fld>
             <a:endParaRPr lang="en-US"/>
           </a:p>
@@ -570,7 +576,7 @@
           <a:p>
             <a:fld id="{982D7743-9A1D-43D5-BBB3-9B0F523A7A95}" type="datetimeFigureOut">
               <a:rPr lang="en-US" smtClean="0"/>
-              <a:t>10/10/2019</a:t>
+              <a:t>12/19/2019</a:t>
             </a:fld>
             <a:endParaRPr lang="en-US"/>
           </a:p>
@@ -764,7 +770,7 @@
           <a:p>
             <a:fld id="{982D7743-9A1D-43D5-BBB3-9B0F523A7A95}" type="datetimeFigureOut">
               <a:rPr lang="en-US" smtClean="0"/>
-              <a:t>10/10/2019</a:t>
+              <a:t>12/19/2019</a:t>
             </a:fld>
             <a:endParaRPr lang="en-US"/>
           </a:p>
@@ -1035,7 +1041,7 @@
           <a:p>
             <a:fld id="{982D7743-9A1D-43D5-BBB3-9B0F523A7A95}" type="datetimeFigureOut">
               <a:rPr lang="en-US" smtClean="0"/>
-              <a:t>10/10/2019</a:t>
+              <a:t>12/19/2019</a:t>
             </a:fld>
             <a:endParaRPr lang="en-US"/>
           </a:p>
@@ -1362,7 +1368,7 @@
           <a:p>
             <a:fld id="{982D7743-9A1D-43D5-BBB3-9B0F523A7A95}" type="datetimeFigureOut">
               <a:rPr lang="en-US" smtClean="0"/>
-              <a:t>10/10/2019</a:t>
+              <a:t>12/19/2019</a:t>
             </a:fld>
             <a:endParaRPr lang="en-US"/>
           </a:p>
@@ -1981,7 +1987,7 @@
           <a:p>
             <a:fld id="{982D7743-9A1D-43D5-BBB3-9B0F523A7A95}" type="datetimeFigureOut">
               <a:rPr lang="en-US" smtClean="0"/>
-              <a:t>10/10/2019</a:t>
+              <a:t>12/19/2019</a:t>
             </a:fld>
             <a:endParaRPr lang="en-US"/>
           </a:p>
@@ -2828,7 +2834,7 @@
           <a:p>
             <a:fld id="{982D7743-9A1D-43D5-BBB3-9B0F523A7A95}" type="datetimeFigureOut">
               <a:rPr lang="en-US" smtClean="0"/>
-              <a:t>10/10/2019</a:t>
+              <a:t>12/19/2019</a:t>
             </a:fld>
             <a:endParaRPr lang="en-US"/>
           </a:p>
@@ -2998,7 +3004,7 @@
           <a:p>
             <a:fld id="{982D7743-9A1D-43D5-BBB3-9B0F523A7A95}" type="datetimeFigureOut">
               <a:rPr lang="en-US" smtClean="0"/>
-              <a:t>10/10/2019</a:t>
+              <a:t>12/19/2019</a:t>
             </a:fld>
             <a:endParaRPr lang="en-US"/>
           </a:p>
@@ -3178,7 +3184,7 @@
           <a:p>
             <a:fld id="{982D7743-9A1D-43D5-BBB3-9B0F523A7A95}" type="datetimeFigureOut">
               <a:rPr lang="en-US" smtClean="0"/>
-              <a:t>10/10/2019</a:t>
+              <a:t>12/19/2019</a:t>
             </a:fld>
             <a:endParaRPr lang="en-US"/>
           </a:p>
@@ -3348,7 +3354,7 @@
           <a:p>
             <a:fld id="{982D7743-9A1D-43D5-BBB3-9B0F523A7A95}" type="datetimeFigureOut">
               <a:rPr lang="en-US" smtClean="0"/>
-              <a:t>10/10/2019</a:t>
+              <a:t>12/19/2019</a:t>
             </a:fld>
             <a:endParaRPr lang="en-US"/>
           </a:p>
@@ -3595,7 +3601,7 @@
           <a:p>
             <a:fld id="{982D7743-9A1D-43D5-BBB3-9B0F523A7A95}" type="datetimeFigureOut">
               <a:rPr lang="en-US" smtClean="0"/>
-              <a:t>10/10/2019</a:t>
+              <a:t>12/19/2019</a:t>
             </a:fld>
             <a:endParaRPr lang="en-US"/>
           </a:p>
@@ -3887,7 +3893,7 @@
           <a:p>
             <a:fld id="{982D7743-9A1D-43D5-BBB3-9B0F523A7A95}" type="datetimeFigureOut">
               <a:rPr lang="en-US" smtClean="0"/>
-              <a:t>10/10/2019</a:t>
+              <a:t>12/19/2019</a:t>
             </a:fld>
             <a:endParaRPr lang="en-US"/>
           </a:p>
@@ -4331,7 +4337,7 @@
           <a:p>
             <a:fld id="{982D7743-9A1D-43D5-BBB3-9B0F523A7A95}" type="datetimeFigureOut">
               <a:rPr lang="en-US" smtClean="0"/>
-              <a:t>10/10/2019</a:t>
+              <a:t>12/19/2019</a:t>
             </a:fld>
             <a:endParaRPr lang="en-US"/>
           </a:p>
@@ -4449,7 +4455,7 @@
           <a:p>
             <a:fld id="{982D7743-9A1D-43D5-BBB3-9B0F523A7A95}" type="datetimeFigureOut">
               <a:rPr lang="en-US" smtClean="0"/>
-              <a:t>10/10/2019</a:t>
+              <a:t>12/19/2019</a:t>
             </a:fld>
             <a:endParaRPr lang="en-US"/>
           </a:p>
@@ -4544,7 +4550,7 @@
           <a:p>
             <a:fld id="{982D7743-9A1D-43D5-BBB3-9B0F523A7A95}" type="datetimeFigureOut">
               <a:rPr lang="en-US" smtClean="0"/>
-              <a:t>10/10/2019</a:t>
+              <a:t>12/19/2019</a:t>
             </a:fld>
             <a:endParaRPr lang="en-US"/>
           </a:p>
@@ -4823,7 +4829,7 @@
           <a:p>
             <a:fld id="{982D7743-9A1D-43D5-BBB3-9B0F523A7A95}" type="datetimeFigureOut">
               <a:rPr lang="en-US" smtClean="0"/>
-              <a:t>10/10/2019</a:t>
+              <a:t>12/19/2019</a:t>
             </a:fld>
             <a:endParaRPr lang="en-US"/>
           </a:p>
@@ -5098,7 +5104,7 @@
           <a:p>
             <a:fld id="{982D7743-9A1D-43D5-BBB3-9B0F523A7A95}" type="datetimeFigureOut">
               <a:rPr lang="en-US" smtClean="0"/>
-              <a:t>10/10/2019</a:t>
+              <a:t>12/19/2019</a:t>
             </a:fld>
             <a:endParaRPr lang="en-US"/>
           </a:p>
@@ -5521,7 +5527,7 @@
           <a:p>
             <a:fld id="{982D7743-9A1D-43D5-BBB3-9B0F523A7A95}" type="datetimeFigureOut">
               <a:rPr lang="en-US" smtClean="0"/>
-              <a:t>10/10/2019</a:t>
+              <a:t>12/19/2019</a:t>
             </a:fld>
             <a:endParaRPr lang="en-US"/>
           </a:p>
@@ -6049,6 +6055,141 @@
           <a:chExt cx="0" cy="0"/>
         </a:xfrm>
       </p:grpSpPr>
+      <p:sp>
+        <p:nvSpPr>
+          <p:cNvPr id="2" name="Title 1">
+            <a:extLst>
+              <a:ext uri="{FF2B5EF4-FFF2-40B4-BE49-F238E27FC236}">
+                <a16:creationId xmlns:a16="http://schemas.microsoft.com/office/drawing/2014/main" id="{A1091588-F12D-41F4-839D-DA3073B3BD80}"/>
+              </a:ext>
+            </a:extLst>
+          </p:cNvPr>
+          <p:cNvSpPr>
+            <a:spLocks noGrp="1"/>
+          </p:cNvSpPr>
+          <p:nvPr>
+            <p:ph type="title"/>
+          </p:nvPr>
+        </p:nvSpPr>
+        <p:spPr>
+          <a:xfrm>
+            <a:off x="645130" y="221809"/>
+            <a:ext cx="9404723" cy="905027"/>
+          </a:xfrm>
+        </p:spPr>
+        <p:txBody>
+          <a:bodyPr/>
+          <a:lstStyle/>
+          <a:p>
+            <a:r>
+              <a:rPr lang="en-US" dirty="0"/>
+              <a:t>Type Script</a:t>
+            </a:r>
+          </a:p>
+        </p:txBody>
+      </p:sp>
+    </p:spTree>
+    <p:extLst>
+      <p:ext uri="{BB962C8B-B14F-4D97-AF65-F5344CB8AC3E}">
+        <p14:creationId xmlns:p14="http://schemas.microsoft.com/office/powerpoint/2010/main" val="2069250908"/>
+      </p:ext>
+    </p:extLst>
+  </p:cSld>
+  <p:clrMapOvr>
+    <a:masterClrMapping/>
+  </p:clrMapOvr>
+</p:sld>
+</file>
+
+<file path=ppt/slides/slide2.xml><?xml version="1.0" encoding="utf-8"?>
+<p:sld xmlns:a="http://schemas.openxmlformats.org/drawingml/2006/main" xmlns:r="http://schemas.openxmlformats.org/officeDocument/2006/relationships" xmlns:p="http://schemas.openxmlformats.org/presentationml/2006/main">
+  <p:cSld>
+    <p:spTree>
+      <p:nvGrpSpPr>
+        <p:cNvPr id="1" name=""/>
+        <p:cNvGrpSpPr/>
+        <p:nvPr/>
+      </p:nvGrpSpPr>
+      <p:grpSpPr>
+        <a:xfrm>
+          <a:off x="0" y="0"/>
+          <a:ext cx="0" cy="0"/>
+          <a:chOff x="0" y="0"/>
+          <a:chExt cx="0" cy="0"/>
+        </a:xfrm>
+      </p:grpSpPr>
+      <p:sp>
+        <p:nvSpPr>
+          <p:cNvPr id="3" name="Subtitle 2">
+            <a:extLst>
+              <a:ext uri="{FF2B5EF4-FFF2-40B4-BE49-F238E27FC236}">
+                <a16:creationId xmlns:a16="http://schemas.microsoft.com/office/drawing/2014/main" id="{68B25623-0EAE-4446-B23C-210B5F9691E4}"/>
+              </a:ext>
+            </a:extLst>
+          </p:cNvPr>
+          <p:cNvSpPr>
+            <a:spLocks noGrp="1"/>
+          </p:cNvSpPr>
+          <p:nvPr>
+            <p:ph type="subTitle" idx="1"/>
+          </p:nvPr>
+        </p:nvSpPr>
+        <p:spPr>
+          <a:xfrm>
+            <a:off x="4295320" y="2998290"/>
+            <a:ext cx="2992172" cy="861420"/>
+          </a:xfrm>
+        </p:spPr>
+        <p:txBody>
+          <a:bodyPr>
+            <a:normAutofit fontScale="92500" lnSpcReduction="10000"/>
+          </a:bodyPr>
+          <a:lstStyle/>
+          <a:p>
+            <a:r>
+              <a:rPr lang="en-US" sz="6000" b="1" dirty="0">
+                <a:solidFill>
+                  <a:schemeClr val="accent5">
+                    <a:lumMod val="20000"/>
+                    <a:lumOff val="80000"/>
+                  </a:schemeClr>
+                </a:solidFill>
+              </a:rPr>
+              <a:t>Oh my!</a:t>
+            </a:r>
+          </a:p>
+        </p:txBody>
+      </p:sp>
+    </p:spTree>
+    <p:extLst>
+      <p:ext uri="{BB962C8B-B14F-4D97-AF65-F5344CB8AC3E}">
+        <p14:creationId xmlns:p14="http://schemas.microsoft.com/office/powerpoint/2010/main" val="1308688796"/>
+      </p:ext>
+    </p:extLst>
+  </p:cSld>
+  <p:clrMapOvr>
+    <a:masterClrMapping/>
+  </p:clrMapOvr>
+</p:sld>
+</file>
+
+<file path=ppt/slides/slide3.xml><?xml version="1.0" encoding="utf-8"?>
+<p:sld xmlns:a="http://schemas.openxmlformats.org/drawingml/2006/main" xmlns:r="http://schemas.openxmlformats.org/officeDocument/2006/relationships" xmlns:p="http://schemas.openxmlformats.org/presentationml/2006/main">
+  <p:cSld>
+    <p:spTree>
+      <p:nvGrpSpPr>
+        <p:cNvPr id="1" name=""/>
+        <p:cNvGrpSpPr/>
+        <p:nvPr/>
+      </p:nvGrpSpPr>
+      <p:grpSpPr>
+        <a:xfrm>
+          <a:off x="0" y="0"/>
+          <a:ext cx="0" cy="0"/>
+          <a:chOff x="0" y="0"/>
+          <a:chExt cx="0" cy="0"/>
+        </a:xfrm>
+      </p:grpSpPr>
       <p:pic>
         <p:nvPicPr>
           <p:cNvPr id="5" name="Picture 4">
@@ -6098,7 +6239,7 @@
 </p:sld>
 </file>
 
-<file path=ppt/slides/slide2.xml><?xml version="1.0" encoding="utf-8"?>
+<file path=ppt/slides/slide4.xml><?xml version="1.0" encoding="utf-8"?>
 <p:sld xmlns:a="http://schemas.openxmlformats.org/drawingml/2006/main" xmlns:r="http://schemas.openxmlformats.org/officeDocument/2006/relationships" xmlns:p="http://schemas.openxmlformats.org/presentationml/2006/main">
   <p:cSld>
     <p:spTree>
@@ -6120,104 +6261,6 @@
           <p:cNvPr id="2" name="Title 1">
             <a:extLst>
               <a:ext uri="{FF2B5EF4-FFF2-40B4-BE49-F238E27FC236}">
-                <a16:creationId xmlns:a16="http://schemas.microsoft.com/office/drawing/2014/main" id="{538C537C-5438-463B-8AC3-021C294BCBD7}"/>
-              </a:ext>
-            </a:extLst>
-          </p:cNvPr>
-          <p:cNvSpPr>
-            <a:spLocks noGrp="1"/>
-          </p:cNvSpPr>
-          <p:nvPr>
-            <p:ph type="ctrTitle"/>
-          </p:nvPr>
-        </p:nvSpPr>
-        <p:spPr>
-          <a:xfrm>
-            <a:off x="517646" y="330198"/>
-            <a:ext cx="8825658" cy="935182"/>
-          </a:xfrm>
-        </p:spPr>
-        <p:txBody>
-          <a:bodyPr/>
-          <a:lstStyle/>
-          <a:p>
-            <a:r>
-              <a:rPr lang="en-US" dirty="0"/>
-              <a:t>Type Script</a:t>
-            </a:r>
-          </a:p>
-        </p:txBody>
-      </p:sp>
-      <p:sp>
-        <p:nvSpPr>
-          <p:cNvPr id="3" name="Subtitle 2">
-            <a:extLst>
-              <a:ext uri="{FF2B5EF4-FFF2-40B4-BE49-F238E27FC236}">
-                <a16:creationId xmlns:a16="http://schemas.microsoft.com/office/drawing/2014/main" id="{68B25623-0EAE-4446-B23C-210B5F9691E4}"/>
-              </a:ext>
-            </a:extLst>
-          </p:cNvPr>
-          <p:cNvSpPr>
-            <a:spLocks noGrp="1"/>
-          </p:cNvSpPr>
-          <p:nvPr>
-            <p:ph type="subTitle" idx="1"/>
-          </p:nvPr>
-        </p:nvSpPr>
-        <p:spPr>
-          <a:xfrm>
-            <a:off x="4295320" y="2998290"/>
-            <a:ext cx="2992172" cy="861420"/>
-          </a:xfrm>
-        </p:spPr>
-        <p:txBody>
-          <a:bodyPr>
-            <a:normAutofit fontScale="92500" lnSpcReduction="10000"/>
-          </a:bodyPr>
-          <a:lstStyle/>
-          <a:p>
-            <a:r>
-              <a:rPr lang="en-US" sz="6000" b="1" dirty="0"/>
-              <a:t>Oh my!</a:t>
-            </a:r>
-          </a:p>
-        </p:txBody>
-      </p:sp>
-    </p:spTree>
-    <p:extLst>
-      <p:ext uri="{BB962C8B-B14F-4D97-AF65-F5344CB8AC3E}">
-        <p14:creationId xmlns:p14="http://schemas.microsoft.com/office/powerpoint/2010/main" val="1308688796"/>
-      </p:ext>
-    </p:extLst>
-  </p:cSld>
-  <p:clrMapOvr>
-    <a:masterClrMapping/>
-  </p:clrMapOvr>
-</p:sld>
-</file>
-
-<file path=ppt/slides/slide3.xml><?xml version="1.0" encoding="utf-8"?>
-<p:sld xmlns:a="http://schemas.openxmlformats.org/drawingml/2006/main" xmlns:r="http://schemas.openxmlformats.org/officeDocument/2006/relationships" xmlns:p="http://schemas.openxmlformats.org/presentationml/2006/main">
-  <p:cSld>
-    <p:spTree>
-      <p:nvGrpSpPr>
-        <p:cNvPr id="1" name=""/>
-        <p:cNvGrpSpPr/>
-        <p:nvPr/>
-      </p:nvGrpSpPr>
-      <p:grpSpPr>
-        <a:xfrm>
-          <a:off x="0" y="0"/>
-          <a:ext cx="0" cy="0"/>
-          <a:chOff x="0" y="0"/>
-          <a:chExt cx="0" cy="0"/>
-        </a:xfrm>
-      </p:grpSpPr>
-      <p:sp>
-        <p:nvSpPr>
-          <p:cNvPr id="2" name="Title 1">
-            <a:extLst>
-              <a:ext uri="{FF2B5EF4-FFF2-40B4-BE49-F238E27FC236}">
                 <a16:creationId xmlns:a16="http://schemas.microsoft.com/office/drawing/2014/main" id="{A1091588-F12D-41F4-839D-DA3073B3BD80}"/>
               </a:ext>
             </a:extLst>
@@ -6266,7 +6309,7 @@
     </p:spTree>
     <p:extLst>
       <p:ext uri="{BB962C8B-B14F-4D97-AF65-F5344CB8AC3E}">
-        <p14:creationId xmlns:p14="http://schemas.microsoft.com/office/powerpoint/2010/main" val="2069250908"/>
+        <p14:creationId xmlns:p14="http://schemas.microsoft.com/office/powerpoint/2010/main" val="3369333263"/>
       </p:ext>
     </p:extLst>
   </p:cSld>

</xml_diff>